<commit_message>
Modified and replaced files.
1.Fixed the problem of calling Baidu map at the same time;
2. The positioning program is modified to a new rough time calculation method.
</commit_message>
<xml_diff>
--- a/PostionSystem/Documentation/picture.pptx
+++ b/PostionSystem/Documentation/picture.pptx
@@ -260,7 +260,7 @@
           <a:p>
             <a:fld id="{A96B96A6-2223-427B-8CF2-8155A13E0541}" type="datetimeFigureOut">
               <a:rPr lang="zh-CN" altLang="en-US" smtClean="0"/>
-              <a:t>2020/9/15</a:t>
+              <a:t>2020/11/10</a:t>
             </a:fld>
             <a:endParaRPr lang="zh-CN" altLang="en-US"/>
           </a:p>
@@ -458,7 +458,7 @@
           <a:p>
             <a:fld id="{A96B96A6-2223-427B-8CF2-8155A13E0541}" type="datetimeFigureOut">
               <a:rPr lang="zh-CN" altLang="en-US" smtClean="0"/>
-              <a:t>2020/9/15</a:t>
+              <a:t>2020/11/10</a:t>
             </a:fld>
             <a:endParaRPr lang="zh-CN" altLang="en-US"/>
           </a:p>
@@ -666,7 +666,7 @@
           <a:p>
             <a:fld id="{A96B96A6-2223-427B-8CF2-8155A13E0541}" type="datetimeFigureOut">
               <a:rPr lang="zh-CN" altLang="en-US" smtClean="0"/>
-              <a:t>2020/9/15</a:t>
+              <a:t>2020/11/10</a:t>
             </a:fld>
             <a:endParaRPr lang="zh-CN" altLang="en-US"/>
           </a:p>
@@ -864,7 +864,7 @@
           <a:p>
             <a:fld id="{A96B96A6-2223-427B-8CF2-8155A13E0541}" type="datetimeFigureOut">
               <a:rPr lang="zh-CN" altLang="en-US" smtClean="0"/>
-              <a:t>2020/9/15</a:t>
+              <a:t>2020/11/10</a:t>
             </a:fld>
             <a:endParaRPr lang="zh-CN" altLang="en-US"/>
           </a:p>
@@ -1139,7 +1139,7 @@
           <a:p>
             <a:fld id="{A96B96A6-2223-427B-8CF2-8155A13E0541}" type="datetimeFigureOut">
               <a:rPr lang="zh-CN" altLang="en-US" smtClean="0"/>
-              <a:t>2020/9/15</a:t>
+              <a:t>2020/11/10</a:t>
             </a:fld>
             <a:endParaRPr lang="zh-CN" altLang="en-US"/>
           </a:p>
@@ -1404,7 +1404,7 @@
           <a:p>
             <a:fld id="{A96B96A6-2223-427B-8CF2-8155A13E0541}" type="datetimeFigureOut">
               <a:rPr lang="zh-CN" altLang="en-US" smtClean="0"/>
-              <a:t>2020/9/15</a:t>
+              <a:t>2020/11/10</a:t>
             </a:fld>
             <a:endParaRPr lang="zh-CN" altLang="en-US"/>
           </a:p>
@@ -1816,7 +1816,7 @@
           <a:p>
             <a:fld id="{A96B96A6-2223-427B-8CF2-8155A13E0541}" type="datetimeFigureOut">
               <a:rPr lang="zh-CN" altLang="en-US" smtClean="0"/>
-              <a:t>2020/9/15</a:t>
+              <a:t>2020/11/10</a:t>
             </a:fld>
             <a:endParaRPr lang="zh-CN" altLang="en-US"/>
           </a:p>
@@ -1957,7 +1957,7 @@
           <a:p>
             <a:fld id="{A96B96A6-2223-427B-8CF2-8155A13E0541}" type="datetimeFigureOut">
               <a:rPr lang="zh-CN" altLang="en-US" smtClean="0"/>
-              <a:t>2020/9/15</a:t>
+              <a:t>2020/11/10</a:t>
             </a:fld>
             <a:endParaRPr lang="zh-CN" altLang="en-US"/>
           </a:p>
@@ -2070,7 +2070,7 @@
           <a:p>
             <a:fld id="{A96B96A6-2223-427B-8CF2-8155A13E0541}" type="datetimeFigureOut">
               <a:rPr lang="zh-CN" altLang="en-US" smtClean="0"/>
-              <a:t>2020/9/15</a:t>
+              <a:t>2020/11/10</a:t>
             </a:fld>
             <a:endParaRPr lang="zh-CN" altLang="en-US"/>
           </a:p>
@@ -2381,7 +2381,7 @@
           <a:p>
             <a:fld id="{A96B96A6-2223-427B-8CF2-8155A13E0541}" type="datetimeFigureOut">
               <a:rPr lang="zh-CN" altLang="en-US" smtClean="0"/>
-              <a:t>2020/9/15</a:t>
+              <a:t>2020/11/10</a:t>
             </a:fld>
             <a:endParaRPr lang="zh-CN" altLang="en-US"/>
           </a:p>
@@ -2669,7 +2669,7 @@
           <a:p>
             <a:fld id="{A96B96A6-2223-427B-8CF2-8155A13E0541}" type="datetimeFigureOut">
               <a:rPr lang="zh-CN" altLang="en-US" smtClean="0"/>
-              <a:t>2020/9/15</a:t>
+              <a:t>2020/11/10</a:t>
             </a:fld>
             <a:endParaRPr lang="zh-CN" altLang="en-US"/>
           </a:p>
@@ -2910,7 +2910,7 @@
           <a:p>
             <a:fld id="{A96B96A6-2223-427B-8CF2-8155A13E0541}" type="datetimeFigureOut">
               <a:rPr lang="zh-CN" altLang="en-US" smtClean="0"/>
-              <a:t>2020/9/15</a:t>
+              <a:t>2020/11/10</a:t>
             </a:fld>
             <a:endParaRPr lang="zh-CN" altLang="en-US"/>
           </a:p>
@@ -5178,18 +5178,11 @@
               <a:lstStyle/>
               <a:p>
                 <a:r>
-                  <a:rPr lang="en-US" altLang="zh-CN" sz="2400" b="1" dirty="0">
-                    <a:latin typeface="黑体" panose="02010609060101010101" pitchFamily="49" charset="-122"/>
-                    <a:ea typeface="黑体" panose="02010609060101010101" pitchFamily="49" charset="-122"/>
-                  </a:rPr>
-                  <a:t>Tek</a:t>
-                </a:r>
-                <a:r>
                   <a:rPr lang="zh-CN" altLang="en-US" sz="2400" b="1" dirty="0">
                     <a:latin typeface="黑体" panose="02010609060101010101" pitchFamily="49" charset="-122"/>
                     <a:ea typeface="黑体" panose="02010609060101010101" pitchFamily="49" charset="-122"/>
                   </a:rPr>
-                  <a:t>采数处理部分</a:t>
+                  <a:t>硬件采集处理部分</a:t>
                 </a:r>
               </a:p>
             </p:txBody>
@@ -6490,15 +6483,15 @@
         </p:nvSpPr>
         <p:spPr>
           <a:xfrm>
-            <a:off x="151692" y="4210529"/>
-            <a:ext cx="1968626" cy="740008"/>
+            <a:off x="151691" y="4210529"/>
+            <a:ext cx="2074021" cy="740008"/>
           </a:xfrm>
           <a:prstGeom prst="callout1">
             <a:avLst>
               <a:gd name="adj1" fmla="val 55501"/>
               <a:gd name="adj2" fmla="val 105834"/>
               <a:gd name="adj3" fmla="val 62760"/>
-              <a:gd name="adj4" fmla="val 122403"/>
+              <a:gd name="adj4" fmla="val 118123"/>
             </a:avLst>
           </a:prstGeom>
           <a:solidFill>
@@ -6626,12 +6619,8 @@
           <a:p>
             <a:pPr algn="ctr"/>
             <a:r>
-              <a:rPr lang="en-US" altLang="zh-CN" sz="1600" dirty="0"/>
-              <a:t>Tek</a:t>
-            </a:r>
-            <a:r>
               <a:rPr lang="zh-CN" altLang="en-US" sz="1600" dirty="0"/>
-              <a:t>捕获的参数设置</a:t>
+              <a:t>硬件采集的参数设置</a:t>
             </a:r>
             <a:endParaRPr lang="en-US" altLang="zh-CN" sz="1600" dirty="0"/>
           </a:p>

</xml_diff>